<commit_message>
Polish contents ComputerLab5 for Moodle version.
</commit_message>
<xml_diff>
--- a/COMPUTER LAB 5/pictures/StataOutput-Collection.pptx
+++ b/COMPUTER LAB 5/pictures/StataOutput-Collection.pptx
@@ -274,7 +274,7 @@
           <a:p>
             <a:fld id="{AD5203C5-0008-A147-A56A-FFD1E4F8F47F}" type="datetimeFigureOut">
               <a:rPr lang="en-US" smtClean="0"/>
-              <a:t>3/5/24</a:t>
+              <a:t>3/9/24</a:t>
             </a:fld>
             <a:endParaRPr lang="en-US"/>
           </a:p>
@@ -474,7 +474,7 @@
           <a:p>
             <a:fld id="{AD5203C5-0008-A147-A56A-FFD1E4F8F47F}" type="datetimeFigureOut">
               <a:rPr lang="en-US" smtClean="0"/>
-              <a:t>3/5/24</a:t>
+              <a:t>3/9/24</a:t>
             </a:fld>
             <a:endParaRPr lang="en-US"/>
           </a:p>
@@ -684,7 +684,7 @@
           <a:p>
             <a:fld id="{AD5203C5-0008-A147-A56A-FFD1E4F8F47F}" type="datetimeFigureOut">
               <a:rPr lang="en-US" smtClean="0"/>
-              <a:t>3/5/24</a:t>
+              <a:t>3/9/24</a:t>
             </a:fld>
             <a:endParaRPr lang="en-US"/>
           </a:p>
@@ -884,7 +884,7 @@
           <a:p>
             <a:fld id="{AD5203C5-0008-A147-A56A-FFD1E4F8F47F}" type="datetimeFigureOut">
               <a:rPr lang="en-US" smtClean="0"/>
-              <a:t>3/5/24</a:t>
+              <a:t>3/9/24</a:t>
             </a:fld>
             <a:endParaRPr lang="en-US"/>
           </a:p>
@@ -1160,7 +1160,7 @@
           <a:p>
             <a:fld id="{AD5203C5-0008-A147-A56A-FFD1E4F8F47F}" type="datetimeFigureOut">
               <a:rPr lang="en-US" smtClean="0"/>
-              <a:t>3/5/24</a:t>
+              <a:t>3/9/24</a:t>
             </a:fld>
             <a:endParaRPr lang="en-US"/>
           </a:p>
@@ -1428,7 +1428,7 @@
           <a:p>
             <a:fld id="{AD5203C5-0008-A147-A56A-FFD1E4F8F47F}" type="datetimeFigureOut">
               <a:rPr lang="en-US" smtClean="0"/>
-              <a:t>3/5/24</a:t>
+              <a:t>3/9/24</a:t>
             </a:fld>
             <a:endParaRPr lang="en-US"/>
           </a:p>
@@ -1843,7 +1843,7 @@
           <a:p>
             <a:fld id="{AD5203C5-0008-A147-A56A-FFD1E4F8F47F}" type="datetimeFigureOut">
               <a:rPr lang="en-US" smtClean="0"/>
-              <a:t>3/5/24</a:t>
+              <a:t>3/9/24</a:t>
             </a:fld>
             <a:endParaRPr lang="en-US"/>
           </a:p>
@@ -1985,7 +1985,7 @@
           <a:p>
             <a:fld id="{AD5203C5-0008-A147-A56A-FFD1E4F8F47F}" type="datetimeFigureOut">
               <a:rPr lang="en-US" smtClean="0"/>
-              <a:t>3/5/24</a:t>
+              <a:t>3/9/24</a:t>
             </a:fld>
             <a:endParaRPr lang="en-US"/>
           </a:p>
@@ -2098,7 +2098,7 @@
           <a:p>
             <a:fld id="{AD5203C5-0008-A147-A56A-FFD1E4F8F47F}" type="datetimeFigureOut">
               <a:rPr lang="en-US" smtClean="0"/>
-              <a:t>3/5/24</a:t>
+              <a:t>3/9/24</a:t>
             </a:fld>
             <a:endParaRPr lang="en-US"/>
           </a:p>
@@ -2411,7 +2411,7 @@
           <a:p>
             <a:fld id="{AD5203C5-0008-A147-A56A-FFD1E4F8F47F}" type="datetimeFigureOut">
               <a:rPr lang="en-US" smtClean="0"/>
-              <a:t>3/5/24</a:t>
+              <a:t>3/9/24</a:t>
             </a:fld>
             <a:endParaRPr lang="en-US"/>
           </a:p>
@@ -2700,7 +2700,7 @@
           <a:p>
             <a:fld id="{AD5203C5-0008-A147-A56A-FFD1E4F8F47F}" type="datetimeFigureOut">
               <a:rPr lang="en-US" smtClean="0"/>
-              <a:t>3/5/24</a:t>
+              <a:t>3/9/24</a:t>
             </a:fld>
             <a:endParaRPr lang="en-US"/>
           </a:p>
@@ -2943,7 +2943,7 @@
           <a:p>
             <a:fld id="{AD5203C5-0008-A147-A56A-FFD1E4F8F47F}" type="datetimeFigureOut">
               <a:rPr lang="en-US" smtClean="0"/>
-              <a:t>3/5/24</a:t>
+              <a:t>3/9/24</a:t>
             </a:fld>
             <a:endParaRPr lang="en-US"/>
           </a:p>
@@ -3677,6 +3677,35 @@
         <p:spPr>
           <a:xfrm>
             <a:off x="252411" y="201537"/>
+            <a:ext cx="11634789" cy="10822710"/>
+          </a:xfrm>
+          <a:prstGeom prst="rect">
+            <a:avLst/>
+          </a:prstGeom>
+        </p:spPr>
+      </p:pic>
+      <p:pic>
+        <p:nvPicPr>
+          <p:cNvPr id="3" name="Picture 2">
+            <a:extLst>
+              <a:ext uri="{FF2B5EF4-FFF2-40B4-BE49-F238E27FC236}">
+                <a16:creationId xmlns:a16="http://schemas.microsoft.com/office/drawing/2014/main" id="{A8D0CE9A-3744-B778-10B4-1D6FC5127FA6}"/>
+              </a:ext>
+            </a:extLst>
+          </p:cNvPr>
+          <p:cNvPicPr>
+            <a:picLocks noChangeAspect="1"/>
+          </p:cNvPicPr>
+          <p:nvPr/>
+        </p:nvPicPr>
+        <p:blipFill rotWithShape="1">
+          <a:blip r:embed="rId2"/>
+          <a:srcRect r="37990"/>
+          <a:stretch/>
+        </p:blipFill>
+        <p:spPr>
+          <a:xfrm>
+            <a:off x="278605" y="201537"/>
             <a:ext cx="11634789" cy="10822710"/>
           </a:xfrm>
           <a:prstGeom prst="rect">

</xml_diff>